<commit_message>
Report corrections and visualizations
</commit_message>
<xml_diff>
--- a/report/media/visualizations.pptx
+++ b/report/media/visualizations.pptx
@@ -6,6 +6,7 @@
   </p:sldMasterIdLst>
   <p:sldIdLst>
     <p:sldId id="256" r:id="rId2"/>
+    <p:sldId id="257" r:id="rId3"/>
   </p:sldIdLst>
   <p:sldSz cx="12192000" cy="6858000"/>
   <p:notesSz cx="6858000" cy="9144000"/>
@@ -104,6 +105,11 @@
       </a:defRPr>
     </a:lvl9pPr>
   </p:defaultTextStyle>
+  <p:extLst>
+    <p:ext uri="{EFAFB233-063F-42B5-8137-9DF3F51BA10A}">
+      <p15:sldGuideLst xmlns:p15="http://schemas.microsoft.com/office/powerpoint/2012/main"/>
+    </p:ext>
+  </p:extLst>
 </p:presentation>
 </file>
 
@@ -254,7 +260,7 @@
           <a:p>
             <a:fld id="{79D89F47-10E7-47C5-80EE-DF99C4EF433D}" type="datetimeFigureOut">
               <a:rPr lang="en-US" smtClean="0"/>
-              <a:t>6/21/2018</a:t>
+              <a:t>6/22/2018</a:t>
             </a:fld>
             <a:endParaRPr lang="en-US"/>
           </a:p>
@@ -452,7 +458,7 @@
           <a:p>
             <a:fld id="{79D89F47-10E7-47C5-80EE-DF99C4EF433D}" type="datetimeFigureOut">
               <a:rPr lang="en-US" smtClean="0"/>
-              <a:t>6/21/2018</a:t>
+              <a:t>6/22/2018</a:t>
             </a:fld>
             <a:endParaRPr lang="en-US"/>
           </a:p>
@@ -660,7 +666,7 @@
           <a:p>
             <a:fld id="{79D89F47-10E7-47C5-80EE-DF99C4EF433D}" type="datetimeFigureOut">
               <a:rPr lang="en-US" smtClean="0"/>
-              <a:t>6/21/2018</a:t>
+              <a:t>6/22/2018</a:t>
             </a:fld>
             <a:endParaRPr lang="en-US"/>
           </a:p>
@@ -858,7 +864,7 @@
           <a:p>
             <a:fld id="{79D89F47-10E7-47C5-80EE-DF99C4EF433D}" type="datetimeFigureOut">
               <a:rPr lang="en-US" smtClean="0"/>
-              <a:t>6/21/2018</a:t>
+              <a:t>6/22/2018</a:t>
             </a:fld>
             <a:endParaRPr lang="en-US"/>
           </a:p>
@@ -1133,7 +1139,7 @@
           <a:p>
             <a:fld id="{79D89F47-10E7-47C5-80EE-DF99C4EF433D}" type="datetimeFigureOut">
               <a:rPr lang="en-US" smtClean="0"/>
-              <a:t>6/21/2018</a:t>
+              <a:t>6/22/2018</a:t>
             </a:fld>
             <a:endParaRPr lang="en-US"/>
           </a:p>
@@ -1398,7 +1404,7 @@
           <a:p>
             <a:fld id="{79D89F47-10E7-47C5-80EE-DF99C4EF433D}" type="datetimeFigureOut">
               <a:rPr lang="en-US" smtClean="0"/>
-              <a:t>6/21/2018</a:t>
+              <a:t>6/22/2018</a:t>
             </a:fld>
             <a:endParaRPr lang="en-US"/>
           </a:p>
@@ -1810,7 +1816,7 @@
           <a:p>
             <a:fld id="{79D89F47-10E7-47C5-80EE-DF99C4EF433D}" type="datetimeFigureOut">
               <a:rPr lang="en-US" smtClean="0"/>
-              <a:t>6/21/2018</a:t>
+              <a:t>6/22/2018</a:t>
             </a:fld>
             <a:endParaRPr lang="en-US"/>
           </a:p>
@@ -1951,7 +1957,7 @@
           <a:p>
             <a:fld id="{79D89F47-10E7-47C5-80EE-DF99C4EF433D}" type="datetimeFigureOut">
               <a:rPr lang="en-US" smtClean="0"/>
-              <a:t>6/21/2018</a:t>
+              <a:t>6/22/2018</a:t>
             </a:fld>
             <a:endParaRPr lang="en-US"/>
           </a:p>
@@ -2064,7 +2070,7 @@
           <a:p>
             <a:fld id="{79D89F47-10E7-47C5-80EE-DF99C4EF433D}" type="datetimeFigureOut">
               <a:rPr lang="en-US" smtClean="0"/>
-              <a:t>6/21/2018</a:t>
+              <a:t>6/22/2018</a:t>
             </a:fld>
             <a:endParaRPr lang="en-US"/>
           </a:p>
@@ -2375,7 +2381,7 @@
           <a:p>
             <a:fld id="{79D89F47-10E7-47C5-80EE-DF99C4EF433D}" type="datetimeFigureOut">
               <a:rPr lang="en-US" smtClean="0"/>
-              <a:t>6/21/2018</a:t>
+              <a:t>6/22/2018</a:t>
             </a:fld>
             <a:endParaRPr lang="en-US"/>
           </a:p>
@@ -2663,7 +2669,7 @@
           <a:p>
             <a:fld id="{79D89F47-10E7-47C5-80EE-DF99C4EF433D}" type="datetimeFigureOut">
               <a:rPr lang="en-US" smtClean="0"/>
-              <a:t>6/21/2018</a:t>
+              <a:t>6/22/2018</a:t>
             </a:fld>
             <a:endParaRPr lang="en-US"/>
           </a:p>
@@ -2904,7 +2910,7 @@
           <a:p>
             <a:fld id="{79D89F47-10E7-47C5-80EE-DF99C4EF433D}" type="datetimeFigureOut">
               <a:rPr lang="en-US" smtClean="0"/>
-              <a:t>6/21/2018</a:t>
+              <a:t>6/22/2018</a:t>
             </a:fld>
             <a:endParaRPr lang="en-US"/>
           </a:p>
@@ -4904,6 +4910,1442 @@
 </p:sld>
 </file>
 
+<file path=ppt/slides/slide2.xml><?xml version="1.0" encoding="utf-8"?>
+<p:sld xmlns:a="http://schemas.openxmlformats.org/drawingml/2006/main" xmlns:r="http://schemas.openxmlformats.org/officeDocument/2006/relationships" xmlns:p="http://schemas.openxmlformats.org/presentationml/2006/main">
+  <p:cSld>
+    <p:spTree>
+      <p:nvGrpSpPr>
+        <p:cNvPr id="1" name=""/>
+        <p:cNvGrpSpPr/>
+        <p:nvPr/>
+      </p:nvGrpSpPr>
+      <p:grpSpPr>
+        <a:xfrm>
+          <a:off x="0" y="0"/>
+          <a:ext cx="0" cy="0"/>
+          <a:chOff x="0" y="0"/>
+          <a:chExt cx="0" cy="0"/>
+        </a:xfrm>
+      </p:grpSpPr>
+      <p:pic>
+        <p:nvPicPr>
+          <p:cNvPr id="18" name="Picture 17" descr="A picture containing building, device&#10;&#10;Description generated with high confidence">
+            <a:extLst>
+              <a:ext uri="{FF2B5EF4-FFF2-40B4-BE49-F238E27FC236}">
+                <a16:creationId xmlns:a16="http://schemas.microsoft.com/office/drawing/2014/main" id="{034FDB5E-D85C-4F50-9E2A-6F0490D66537}"/>
+              </a:ext>
+            </a:extLst>
+          </p:cNvPr>
+          <p:cNvPicPr>
+            <a:picLocks noChangeAspect="1"/>
+          </p:cNvPicPr>
+          <p:nvPr/>
+        </p:nvPicPr>
+        <p:blipFill>
+          <a:blip r:embed="rId2">
+            <a:extLst>
+              <a:ext uri="{28A0092B-C50C-407E-A947-70E740481C1C}">
+                <a14:useLocalDpi xmlns:a14="http://schemas.microsoft.com/office/drawing/2010/main" val="0"/>
+              </a:ext>
+            </a:extLst>
+          </a:blip>
+          <a:stretch>
+            <a:fillRect/>
+          </a:stretch>
+        </p:blipFill>
+        <p:spPr>
+          <a:xfrm>
+            <a:off x="1308683" y="801818"/>
+            <a:ext cx="2091998" cy="2091998"/>
+          </a:xfrm>
+          <a:prstGeom prst="rect">
+            <a:avLst/>
+          </a:prstGeom>
+        </p:spPr>
+      </p:pic>
+      <p:grpSp>
+        <p:nvGrpSpPr>
+          <p:cNvPr id="23" name="Group 22">
+            <a:extLst>
+              <a:ext uri="{FF2B5EF4-FFF2-40B4-BE49-F238E27FC236}">
+                <a16:creationId xmlns:a16="http://schemas.microsoft.com/office/drawing/2014/main" id="{6A4B95D2-3722-4FB9-9E55-CF838E7D4521}"/>
+              </a:ext>
+            </a:extLst>
+          </p:cNvPr>
+          <p:cNvGrpSpPr/>
+          <p:nvPr/>
+        </p:nvGrpSpPr>
+        <p:grpSpPr>
+          <a:xfrm>
+            <a:off x="7141075" y="801818"/>
+            <a:ext cx="3179837" cy="3179837"/>
+            <a:chOff x="6979298" y="384110"/>
+            <a:chExt cx="5791200" cy="5791200"/>
+          </a:xfrm>
+        </p:grpSpPr>
+        <p:pic>
+          <p:nvPicPr>
+            <p:cNvPr id="14" name="Picture 13" descr="A gate in front of a building&#10;&#10;Description generated with high confidence">
+              <a:extLst>
+                <a:ext uri="{FF2B5EF4-FFF2-40B4-BE49-F238E27FC236}">
+                  <a16:creationId xmlns:a16="http://schemas.microsoft.com/office/drawing/2014/main" id="{89A495B4-7DE6-413D-BF48-A7DAF6C5C8FF}"/>
+                </a:ext>
+              </a:extLst>
+            </p:cNvPr>
+            <p:cNvPicPr>
+              <a:picLocks noChangeAspect="1"/>
+            </p:cNvPicPr>
+            <p:nvPr/>
+          </p:nvPicPr>
+          <p:blipFill>
+            <a:blip r:embed="rId3">
+              <a:extLst>
+                <a:ext uri="{28A0092B-C50C-407E-A947-70E740481C1C}">
+                  <a14:useLocalDpi xmlns:a14="http://schemas.microsoft.com/office/drawing/2010/main" val="0"/>
+                </a:ext>
+              </a:extLst>
+            </a:blip>
+            <a:stretch>
+              <a:fillRect/>
+            </a:stretch>
+          </p:blipFill>
+          <p:spPr>
+            <a:xfrm>
+              <a:off x="6979298" y="384110"/>
+              <a:ext cx="5791200" cy="5791200"/>
+            </a:xfrm>
+            <a:prstGeom prst="rect">
+              <a:avLst/>
+            </a:prstGeom>
+            <a:ln>
+              <a:solidFill>
+                <a:schemeClr val="tx1"/>
+              </a:solidFill>
+              <a:prstDash val="solid"/>
+            </a:ln>
+          </p:spPr>
+        </p:pic>
+        <p:sp>
+          <p:nvSpPr>
+            <p:cNvPr id="19" name="Rectangle 18">
+              <a:extLst>
+                <a:ext uri="{FF2B5EF4-FFF2-40B4-BE49-F238E27FC236}">
+                  <a16:creationId xmlns:a16="http://schemas.microsoft.com/office/drawing/2014/main" id="{3DE9E884-BA78-47C7-8EE5-ECC43A37506D}"/>
+                </a:ext>
+              </a:extLst>
+            </p:cNvPr>
+            <p:cNvSpPr/>
+            <p:nvPr/>
+          </p:nvSpPr>
+          <p:spPr>
+            <a:xfrm>
+              <a:off x="6979298" y="384110"/>
+              <a:ext cx="3810000" cy="3810000"/>
+            </a:xfrm>
+            <a:prstGeom prst="rect">
+              <a:avLst/>
+            </a:prstGeom>
+            <a:noFill/>
+            <a:ln w="28575">
+              <a:solidFill>
+                <a:schemeClr val="accent5">
+                  <a:lumMod val="75000"/>
+                </a:schemeClr>
+              </a:solidFill>
+              <a:prstDash val="solid"/>
+            </a:ln>
+          </p:spPr>
+          <p:style>
+            <a:lnRef idx="2">
+              <a:schemeClr val="dk1">
+                <a:shade val="50000"/>
+              </a:schemeClr>
+            </a:lnRef>
+            <a:fillRef idx="1">
+              <a:schemeClr val="dk1"/>
+            </a:fillRef>
+            <a:effectRef idx="0">
+              <a:schemeClr val="dk1"/>
+            </a:effectRef>
+            <a:fontRef idx="minor">
+              <a:schemeClr val="lt1"/>
+            </a:fontRef>
+          </p:style>
+          <p:txBody>
+            <a:bodyPr rtlCol="0" anchor="ctr"/>
+            <a:lstStyle/>
+            <a:p>
+              <a:pPr algn="ctr"/>
+              <a:endParaRPr lang="en-US"/>
+            </a:p>
+          </p:txBody>
+        </p:sp>
+        <p:sp>
+          <p:nvSpPr>
+            <p:cNvPr id="20" name="Rectangle 19">
+              <a:extLst>
+                <a:ext uri="{FF2B5EF4-FFF2-40B4-BE49-F238E27FC236}">
+                  <a16:creationId xmlns:a16="http://schemas.microsoft.com/office/drawing/2014/main" id="{A889BA16-0E1F-490E-9748-4FE0FC9AE315}"/>
+                </a:ext>
+              </a:extLst>
+            </p:cNvPr>
+            <p:cNvSpPr/>
+            <p:nvPr/>
+          </p:nvSpPr>
+          <p:spPr>
+            <a:xfrm>
+              <a:off x="6979298" y="4194110"/>
+              <a:ext cx="3810000" cy="1981200"/>
+            </a:xfrm>
+            <a:prstGeom prst="rect">
+              <a:avLst/>
+            </a:prstGeom>
+            <a:noFill/>
+            <a:ln w="28575">
+              <a:solidFill>
+                <a:schemeClr val="accent5">
+                  <a:lumMod val="75000"/>
+                </a:schemeClr>
+              </a:solidFill>
+              <a:prstDash val="solid"/>
+            </a:ln>
+          </p:spPr>
+          <p:style>
+            <a:lnRef idx="2">
+              <a:schemeClr val="dk1">
+                <a:shade val="50000"/>
+              </a:schemeClr>
+            </a:lnRef>
+            <a:fillRef idx="1">
+              <a:schemeClr val="dk1"/>
+            </a:fillRef>
+            <a:effectRef idx="0">
+              <a:schemeClr val="dk1"/>
+            </a:effectRef>
+            <a:fontRef idx="minor">
+              <a:schemeClr val="lt1"/>
+            </a:fontRef>
+          </p:style>
+          <p:txBody>
+            <a:bodyPr rtlCol="0" anchor="ctr"/>
+            <a:lstStyle/>
+            <a:p>
+              <a:pPr algn="ctr"/>
+              <a:endParaRPr lang="en-US"/>
+            </a:p>
+          </p:txBody>
+        </p:sp>
+        <p:sp>
+          <p:nvSpPr>
+            <p:cNvPr id="21" name="Rectangle 20">
+              <a:extLst>
+                <a:ext uri="{FF2B5EF4-FFF2-40B4-BE49-F238E27FC236}">
+                  <a16:creationId xmlns:a16="http://schemas.microsoft.com/office/drawing/2014/main" id="{0836A382-A93D-4A28-B8DF-3ED09A4A78DD}"/>
+                </a:ext>
+              </a:extLst>
+            </p:cNvPr>
+            <p:cNvSpPr/>
+            <p:nvPr/>
+          </p:nvSpPr>
+          <p:spPr>
+            <a:xfrm>
+              <a:off x="10789298" y="4194110"/>
+              <a:ext cx="1981200" cy="1981200"/>
+            </a:xfrm>
+            <a:prstGeom prst="rect">
+              <a:avLst/>
+            </a:prstGeom>
+            <a:noFill/>
+            <a:ln w="28575">
+              <a:solidFill>
+                <a:schemeClr val="accent5">
+                  <a:lumMod val="75000"/>
+                </a:schemeClr>
+              </a:solidFill>
+              <a:prstDash val="solid"/>
+            </a:ln>
+          </p:spPr>
+          <p:style>
+            <a:lnRef idx="2">
+              <a:schemeClr val="dk1">
+                <a:shade val="50000"/>
+              </a:schemeClr>
+            </a:lnRef>
+            <a:fillRef idx="1">
+              <a:schemeClr val="dk1"/>
+            </a:fillRef>
+            <a:effectRef idx="0">
+              <a:schemeClr val="dk1"/>
+            </a:effectRef>
+            <a:fontRef idx="minor">
+              <a:schemeClr val="lt1"/>
+            </a:fontRef>
+          </p:style>
+          <p:txBody>
+            <a:bodyPr rtlCol="0" anchor="ctr"/>
+            <a:lstStyle/>
+            <a:p>
+              <a:pPr algn="ctr"/>
+              <a:endParaRPr lang="en-US"/>
+            </a:p>
+          </p:txBody>
+        </p:sp>
+        <p:sp>
+          <p:nvSpPr>
+            <p:cNvPr id="22" name="Rectangle 21">
+              <a:extLst>
+                <a:ext uri="{FF2B5EF4-FFF2-40B4-BE49-F238E27FC236}">
+                  <a16:creationId xmlns:a16="http://schemas.microsoft.com/office/drawing/2014/main" id="{538775D8-FE1A-4938-B101-50136DCE4034}"/>
+                </a:ext>
+              </a:extLst>
+            </p:cNvPr>
+            <p:cNvSpPr/>
+            <p:nvPr/>
+          </p:nvSpPr>
+          <p:spPr>
+            <a:xfrm>
+              <a:off x="10789298" y="384110"/>
+              <a:ext cx="1981200" cy="3810000"/>
+            </a:xfrm>
+            <a:prstGeom prst="rect">
+              <a:avLst/>
+            </a:prstGeom>
+            <a:noFill/>
+            <a:ln w="28575">
+              <a:solidFill>
+                <a:schemeClr val="accent5">
+                  <a:lumMod val="75000"/>
+                </a:schemeClr>
+              </a:solidFill>
+              <a:prstDash val="solid"/>
+            </a:ln>
+          </p:spPr>
+          <p:style>
+            <a:lnRef idx="2">
+              <a:schemeClr val="dk1">
+                <a:shade val="50000"/>
+              </a:schemeClr>
+            </a:lnRef>
+            <a:fillRef idx="1">
+              <a:schemeClr val="dk1"/>
+            </a:fillRef>
+            <a:effectRef idx="0">
+              <a:schemeClr val="dk1"/>
+            </a:effectRef>
+            <a:fontRef idx="minor">
+              <a:schemeClr val="lt1"/>
+            </a:fontRef>
+          </p:style>
+          <p:txBody>
+            <a:bodyPr rtlCol="0" anchor="ctr"/>
+            <a:lstStyle/>
+            <a:p>
+              <a:pPr algn="ctr"/>
+              <a:endParaRPr lang="en-US"/>
+            </a:p>
+          </p:txBody>
+        </p:sp>
+      </p:grpSp>
+      <p:pic>
+        <p:nvPicPr>
+          <p:cNvPr id="16" name="Picture 15" descr="A picture containing building&#10;&#10;Description generated with high confidence">
+            <a:extLst>
+              <a:ext uri="{FF2B5EF4-FFF2-40B4-BE49-F238E27FC236}">
+                <a16:creationId xmlns:a16="http://schemas.microsoft.com/office/drawing/2014/main" id="{01BE7E87-D28C-4EBD-A7AA-CDE8400B8861}"/>
+              </a:ext>
+            </a:extLst>
+          </p:cNvPr>
+          <p:cNvPicPr>
+            <a:picLocks noChangeAspect="1"/>
+          </p:cNvPicPr>
+          <p:nvPr/>
+        </p:nvPicPr>
+        <p:blipFill>
+          <a:blip r:embed="rId4">
+            <a:extLst>
+              <a:ext uri="{28A0092B-C50C-407E-A947-70E740481C1C}">
+                <a14:useLocalDpi xmlns:a14="http://schemas.microsoft.com/office/drawing/2010/main" val="0"/>
+              </a:ext>
+            </a:extLst>
+          </a:blip>
+          <a:stretch>
+            <a:fillRect/>
+          </a:stretch>
+        </p:blipFill>
+        <p:spPr>
+          <a:xfrm>
+            <a:off x="1689696" y="1935729"/>
+            <a:ext cx="2091998" cy="2091998"/>
+          </a:xfrm>
+          <a:prstGeom prst="rect">
+            <a:avLst/>
+          </a:prstGeom>
+        </p:spPr>
+      </p:pic>
+      <p:pic>
+        <p:nvPicPr>
+          <p:cNvPr id="24" name="Picture 23" descr="A picture containing building&#10;&#10;Description generated with high confidence">
+            <a:extLst>
+              <a:ext uri="{FF2B5EF4-FFF2-40B4-BE49-F238E27FC236}">
+                <a16:creationId xmlns:a16="http://schemas.microsoft.com/office/drawing/2014/main" id="{07B7B951-40F1-4A24-A83E-36DB081945BF}"/>
+              </a:ext>
+            </a:extLst>
+          </p:cNvPr>
+          <p:cNvPicPr>
+            <a:picLocks noChangeAspect="1"/>
+          </p:cNvPicPr>
+          <p:nvPr/>
+        </p:nvPicPr>
+        <p:blipFill>
+          <a:blip r:embed="rId4">
+            <a:extLst>
+              <a:ext uri="{28A0092B-C50C-407E-A947-70E740481C1C}">
+                <a14:useLocalDpi xmlns:a14="http://schemas.microsoft.com/office/drawing/2010/main" val="0"/>
+              </a:ext>
+            </a:extLst>
+          </a:blip>
+          <a:stretch>
+            <a:fillRect/>
+          </a:stretch>
+        </p:blipFill>
+        <p:spPr>
+          <a:xfrm>
+            <a:off x="8438744" y="4178374"/>
+            <a:ext cx="815829" cy="815829"/>
+          </a:xfrm>
+          <a:prstGeom prst="rect">
+            <a:avLst/>
+          </a:prstGeom>
+        </p:spPr>
+      </p:pic>
+      <p:cxnSp>
+        <p:nvCxnSpPr>
+          <p:cNvPr id="26" name="Connector: Elbow 25">
+            <a:extLst>
+              <a:ext uri="{FF2B5EF4-FFF2-40B4-BE49-F238E27FC236}">
+                <a16:creationId xmlns:a16="http://schemas.microsoft.com/office/drawing/2014/main" id="{24626699-0743-469B-A622-19FC48D8F773}"/>
+              </a:ext>
+            </a:extLst>
+          </p:cNvPr>
+          <p:cNvCxnSpPr>
+            <a:stCxn id="16" idx="2"/>
+            <a:endCxn id="24" idx="1"/>
+          </p:cNvCxnSpPr>
+          <p:nvPr/>
+        </p:nvCxnSpPr>
+        <p:spPr>
+          <a:xfrm rot="16200000" flipH="1">
+            <a:off x="5307938" y="1455483"/>
+            <a:ext cx="558562" cy="5703049"/>
+          </a:xfrm>
+          <a:prstGeom prst="bentConnector2">
+            <a:avLst/>
+          </a:prstGeom>
+          <a:ln w="38100">
+            <a:solidFill>
+              <a:schemeClr val="tx1"/>
+            </a:solidFill>
+            <a:tailEnd type="triangle"/>
+          </a:ln>
+        </p:spPr>
+        <p:style>
+          <a:lnRef idx="1">
+            <a:schemeClr val="accent1"/>
+          </a:lnRef>
+          <a:fillRef idx="0">
+            <a:schemeClr val="accent1"/>
+          </a:fillRef>
+          <a:effectRef idx="0">
+            <a:schemeClr val="accent1"/>
+          </a:effectRef>
+          <a:fontRef idx="minor">
+            <a:schemeClr val="tx1"/>
+          </a:fontRef>
+        </p:style>
+      </p:cxnSp>
+      <p:cxnSp>
+        <p:nvCxnSpPr>
+          <p:cNvPr id="30" name="Connector: Elbow 29">
+            <a:extLst>
+              <a:ext uri="{FF2B5EF4-FFF2-40B4-BE49-F238E27FC236}">
+                <a16:creationId xmlns:a16="http://schemas.microsoft.com/office/drawing/2014/main" id="{64484BAB-F4FB-44A3-AA03-6E9C3DF92DD5}"/>
+              </a:ext>
+            </a:extLst>
+          </p:cNvPr>
+          <p:cNvCxnSpPr>
+            <a:cxnSpLocks/>
+          </p:cNvCxnSpPr>
+          <p:nvPr/>
+        </p:nvCxnSpPr>
+        <p:spPr>
+          <a:xfrm>
+            <a:off x="3400681" y="1342239"/>
+            <a:ext cx="3740394" cy="0"/>
+          </a:xfrm>
+          <a:prstGeom prst="bentConnector3">
+            <a:avLst/>
+          </a:prstGeom>
+          <a:ln w="38100">
+            <a:solidFill>
+              <a:schemeClr val="tx1"/>
+            </a:solidFill>
+            <a:tailEnd type="triangle"/>
+          </a:ln>
+        </p:spPr>
+        <p:style>
+          <a:lnRef idx="1">
+            <a:schemeClr val="accent1"/>
+          </a:lnRef>
+          <a:fillRef idx="0">
+            <a:schemeClr val="accent1"/>
+          </a:fillRef>
+          <a:effectRef idx="0">
+            <a:schemeClr val="accent1"/>
+          </a:effectRef>
+          <a:fontRef idx="minor">
+            <a:schemeClr val="tx1"/>
+          </a:fontRef>
+        </p:style>
+      </p:cxnSp>
+      <p:cxnSp>
+        <p:nvCxnSpPr>
+          <p:cNvPr id="33" name="Straight Connector 32">
+            <a:extLst>
+              <a:ext uri="{FF2B5EF4-FFF2-40B4-BE49-F238E27FC236}">
+                <a16:creationId xmlns:a16="http://schemas.microsoft.com/office/drawing/2014/main" id="{5D6E836A-D999-4512-BB68-EBF1EB2394D9}"/>
+              </a:ext>
+            </a:extLst>
+          </p:cNvPr>
+          <p:cNvCxnSpPr>
+            <a:cxnSpLocks/>
+          </p:cNvCxnSpPr>
+          <p:nvPr/>
+        </p:nvCxnSpPr>
+        <p:spPr>
+          <a:xfrm>
+            <a:off x="4043494" y="453006"/>
+            <a:ext cx="0" cy="4337108"/>
+          </a:xfrm>
+          <a:prstGeom prst="line">
+            <a:avLst/>
+          </a:prstGeom>
+          <a:ln w="28575">
+            <a:prstDash val="lgDash"/>
+          </a:ln>
+        </p:spPr>
+        <p:style>
+          <a:lnRef idx="1">
+            <a:schemeClr val="dk1"/>
+          </a:lnRef>
+          <a:fillRef idx="0">
+            <a:schemeClr val="dk1"/>
+          </a:fillRef>
+          <a:effectRef idx="0">
+            <a:schemeClr val="dk1"/>
+          </a:effectRef>
+          <a:fontRef idx="minor">
+            <a:schemeClr val="tx1"/>
+          </a:fontRef>
+        </p:style>
+      </p:cxnSp>
+      <p:cxnSp>
+        <p:nvCxnSpPr>
+          <p:cNvPr id="34" name="Straight Connector 33">
+            <a:extLst>
+              <a:ext uri="{FF2B5EF4-FFF2-40B4-BE49-F238E27FC236}">
+                <a16:creationId xmlns:a16="http://schemas.microsoft.com/office/drawing/2014/main" id="{FA430A0C-6BF5-4DA0-98CC-AC5D60D494E7}"/>
+              </a:ext>
+            </a:extLst>
+          </p:cNvPr>
+          <p:cNvCxnSpPr>
+            <a:cxnSpLocks/>
+          </p:cNvCxnSpPr>
+          <p:nvPr/>
+        </p:nvCxnSpPr>
+        <p:spPr>
+          <a:xfrm>
+            <a:off x="6679036" y="453006"/>
+            <a:ext cx="0" cy="4337108"/>
+          </a:xfrm>
+          <a:prstGeom prst="line">
+            <a:avLst/>
+          </a:prstGeom>
+          <a:ln w="28575">
+            <a:prstDash val="lgDash"/>
+          </a:ln>
+        </p:spPr>
+        <p:style>
+          <a:lnRef idx="1">
+            <a:schemeClr val="dk1"/>
+          </a:lnRef>
+          <a:fillRef idx="0">
+            <a:schemeClr val="dk1"/>
+          </a:fillRef>
+          <a:effectRef idx="0">
+            <a:schemeClr val="dk1"/>
+          </a:effectRef>
+          <a:fontRef idx="minor">
+            <a:schemeClr val="tx1"/>
+          </a:fontRef>
+        </p:style>
+      </p:cxnSp>
+      <p:sp>
+        <p:nvSpPr>
+          <p:cNvPr id="35" name="TextBox 34">
+            <a:extLst>
+              <a:ext uri="{FF2B5EF4-FFF2-40B4-BE49-F238E27FC236}">
+                <a16:creationId xmlns:a16="http://schemas.microsoft.com/office/drawing/2014/main" id="{FD2348CA-98E4-420A-BA0B-BA951B416335}"/>
+              </a:ext>
+            </a:extLst>
+          </p:cNvPr>
+          <p:cNvSpPr txBox="1"/>
+          <p:nvPr/>
+        </p:nvSpPr>
+        <p:spPr>
+          <a:xfrm>
+            <a:off x="4557569" y="268340"/>
+            <a:ext cx="1659429" cy="369332"/>
+          </a:xfrm>
+          <a:prstGeom prst="rect">
+            <a:avLst/>
+          </a:prstGeom>
+          <a:noFill/>
+        </p:spPr>
+        <p:txBody>
+          <a:bodyPr wrap="none" rtlCol="0">
+            <a:spAutoFit/>
+          </a:bodyPr>
+          <a:lstStyle/>
+          <a:p>
+            <a:r>
+              <a:rPr lang="en-US" dirty="0">
+                <a:latin typeface="Arial" panose="020B0604020202020204" pitchFamily="34" charset="0"/>
+                <a:cs typeface="Arial" panose="020B0604020202020204" pitchFamily="34" charset="0"/>
+              </a:rPr>
+              <a:t>Preprocessing</a:t>
+            </a:r>
+          </a:p>
+        </p:txBody>
+      </p:sp>
+      <p:sp>
+        <p:nvSpPr>
+          <p:cNvPr id="38" name="TextBox 37">
+            <a:extLst>
+              <a:ext uri="{FF2B5EF4-FFF2-40B4-BE49-F238E27FC236}">
+                <a16:creationId xmlns:a16="http://schemas.microsoft.com/office/drawing/2014/main" id="{26CB0185-5CF6-457B-8BEE-21284C2B53FC}"/>
+              </a:ext>
+            </a:extLst>
+          </p:cNvPr>
+          <p:cNvSpPr txBox="1"/>
+          <p:nvPr/>
+        </p:nvSpPr>
+        <p:spPr>
+          <a:xfrm>
+            <a:off x="1636801" y="268340"/>
+            <a:ext cx="1522596" cy="369332"/>
+          </a:xfrm>
+          <a:prstGeom prst="rect">
+            <a:avLst/>
+          </a:prstGeom>
+          <a:noFill/>
+        </p:spPr>
+        <p:txBody>
+          <a:bodyPr wrap="none" rtlCol="0">
+            <a:spAutoFit/>
+          </a:bodyPr>
+          <a:lstStyle/>
+          <a:p>
+            <a:r>
+              <a:rPr lang="en-US" dirty="0">
+                <a:latin typeface="Arial" panose="020B0604020202020204" pitchFamily="34" charset="0"/>
+                <a:cs typeface="Arial" panose="020B0604020202020204" pitchFamily="34" charset="0"/>
+              </a:rPr>
+              <a:t>Train dataset</a:t>
+            </a:r>
+          </a:p>
+        </p:txBody>
+      </p:sp>
+      <p:sp>
+        <p:nvSpPr>
+          <p:cNvPr id="39" name="TextBox 38">
+            <a:extLst>
+              <a:ext uri="{FF2B5EF4-FFF2-40B4-BE49-F238E27FC236}">
+                <a16:creationId xmlns:a16="http://schemas.microsoft.com/office/drawing/2014/main" id="{DE34B1C1-7B2C-4098-864F-8E954FB872AA}"/>
+              </a:ext>
+            </a:extLst>
+          </p:cNvPr>
+          <p:cNvSpPr txBox="1"/>
+          <p:nvPr/>
+        </p:nvSpPr>
+        <p:spPr>
+          <a:xfrm>
+            <a:off x="7916227" y="268340"/>
+            <a:ext cx="1864613" cy="369332"/>
+          </a:xfrm>
+          <a:prstGeom prst="rect">
+            <a:avLst/>
+          </a:prstGeom>
+          <a:noFill/>
+        </p:spPr>
+        <p:txBody>
+          <a:bodyPr wrap="none" rtlCol="0">
+            <a:spAutoFit/>
+          </a:bodyPr>
+          <a:lstStyle/>
+          <a:p>
+            <a:r>
+              <a:rPr lang="en-US" dirty="0">
+                <a:latin typeface="Arial" panose="020B0604020202020204" pitchFamily="34" charset="0"/>
+                <a:cs typeface="Arial" panose="020B0604020202020204" pitchFamily="34" charset="0"/>
+              </a:rPr>
+              <a:t>Input to Network</a:t>
+            </a:r>
+          </a:p>
+        </p:txBody>
+      </p:sp>
+      <p:sp>
+        <p:nvSpPr>
+          <p:cNvPr id="40" name="TextBox 39">
+            <a:extLst>
+              <a:ext uri="{FF2B5EF4-FFF2-40B4-BE49-F238E27FC236}">
+                <a16:creationId xmlns:a16="http://schemas.microsoft.com/office/drawing/2014/main" id="{FFA3642A-BD12-45F4-9F85-6A1F531C816A}"/>
+              </a:ext>
+            </a:extLst>
+          </p:cNvPr>
+          <p:cNvSpPr txBox="1"/>
+          <p:nvPr/>
+        </p:nvSpPr>
+        <p:spPr>
+          <a:xfrm>
+            <a:off x="4798019" y="1080631"/>
+            <a:ext cx="1178528" cy="261610"/>
+          </a:xfrm>
+          <a:prstGeom prst="rect">
+            <a:avLst/>
+          </a:prstGeom>
+          <a:noFill/>
+        </p:spPr>
+        <p:txBody>
+          <a:bodyPr wrap="none" rtlCol="0">
+            <a:spAutoFit/>
+          </a:bodyPr>
+          <a:lstStyle/>
+          <a:p>
+            <a:r>
+              <a:rPr lang="en-US" sz="1100" dirty="0">
+                <a:latin typeface="Arial" panose="020B0604020202020204" pitchFamily="34" charset="0"/>
+                <a:cs typeface="Arial" panose="020B0604020202020204" pitchFamily="34" charset="0"/>
+              </a:rPr>
+              <a:t>Mirror boundary</a:t>
+            </a:r>
+          </a:p>
+        </p:txBody>
+      </p:sp>
+      <p:sp>
+        <p:nvSpPr>
+          <p:cNvPr id="41" name="TextBox 40">
+            <a:extLst>
+              <a:ext uri="{FF2B5EF4-FFF2-40B4-BE49-F238E27FC236}">
+                <a16:creationId xmlns:a16="http://schemas.microsoft.com/office/drawing/2014/main" id="{4C48BA54-6690-47E6-9D07-9089CBB0824B}"/>
+              </a:ext>
+            </a:extLst>
+          </p:cNvPr>
+          <p:cNvSpPr txBox="1"/>
+          <p:nvPr/>
+        </p:nvSpPr>
+        <p:spPr>
+          <a:xfrm>
+            <a:off x="4505533" y="3940561"/>
+            <a:ext cx="1997417" cy="600164"/>
+          </a:xfrm>
+          <a:prstGeom prst="rect">
+            <a:avLst/>
+          </a:prstGeom>
+          <a:noFill/>
+        </p:spPr>
+        <p:txBody>
+          <a:bodyPr wrap="square" rtlCol="0">
+            <a:spAutoFit/>
+          </a:bodyPr>
+          <a:lstStyle/>
+          <a:p>
+            <a:pPr algn="ctr"/>
+            <a:r>
+              <a:rPr lang="en-US" sz="1100" dirty="0">
+                <a:latin typeface="Arial" panose="020B0604020202020204" pitchFamily="34" charset="0"/>
+                <a:cs typeface="Arial" panose="020B0604020202020204" pitchFamily="34" charset="0"/>
+              </a:rPr>
+              <a:t>Mirror boundary &amp;</a:t>
+            </a:r>
+          </a:p>
+          <a:p>
+            <a:pPr algn="ctr"/>
+            <a:r>
+              <a:rPr lang="en-US" sz="1100" dirty="0" err="1">
+                <a:latin typeface="Arial" panose="020B0604020202020204" pitchFamily="34" charset="0"/>
+                <a:cs typeface="Arial" panose="020B0604020202020204" pitchFamily="34" charset="0"/>
+              </a:rPr>
+              <a:t>downsample</a:t>
+            </a:r>
+            <a:r>
+              <a:rPr lang="en-US" sz="1100" dirty="0">
+                <a:latin typeface="Arial" panose="020B0604020202020204" pitchFamily="34" charset="0"/>
+                <a:cs typeface="Arial" panose="020B0604020202020204" pitchFamily="34" charset="0"/>
+              </a:rPr>
+              <a:t> with threshold 25% of data contains road</a:t>
+            </a:r>
+          </a:p>
+        </p:txBody>
+      </p:sp>
+      <p:cxnSp>
+        <p:nvCxnSpPr>
+          <p:cNvPr id="43" name="Straight Arrow Connector 42">
+            <a:extLst>
+              <a:ext uri="{FF2B5EF4-FFF2-40B4-BE49-F238E27FC236}">
+                <a16:creationId xmlns:a16="http://schemas.microsoft.com/office/drawing/2014/main" id="{99E4AAA2-9EF5-49C3-BA9B-A2CF6585CD58}"/>
+              </a:ext>
+            </a:extLst>
+          </p:cNvPr>
+          <p:cNvCxnSpPr/>
+          <p:nvPr/>
+        </p:nvCxnSpPr>
+        <p:spPr>
+          <a:xfrm>
+            <a:off x="1199626" y="801818"/>
+            <a:ext cx="0" cy="2091998"/>
+          </a:xfrm>
+          <a:prstGeom prst="straightConnector1">
+            <a:avLst/>
+          </a:prstGeom>
+          <a:ln>
+            <a:headEnd type="triangle"/>
+            <a:tailEnd type="triangle"/>
+          </a:ln>
+        </p:spPr>
+        <p:style>
+          <a:lnRef idx="1">
+            <a:schemeClr val="accent1"/>
+          </a:lnRef>
+          <a:fillRef idx="0">
+            <a:schemeClr val="accent1"/>
+          </a:fillRef>
+          <a:effectRef idx="0">
+            <a:schemeClr val="accent1"/>
+          </a:effectRef>
+          <a:fontRef idx="minor">
+            <a:schemeClr val="tx1"/>
+          </a:fontRef>
+        </p:style>
+      </p:cxnSp>
+      <p:cxnSp>
+        <p:nvCxnSpPr>
+          <p:cNvPr id="44" name="Straight Arrow Connector 43">
+            <a:extLst>
+              <a:ext uri="{FF2B5EF4-FFF2-40B4-BE49-F238E27FC236}">
+                <a16:creationId xmlns:a16="http://schemas.microsoft.com/office/drawing/2014/main" id="{2AB84726-2C14-45BA-B144-244388666DBE}"/>
+              </a:ext>
+            </a:extLst>
+          </p:cNvPr>
+          <p:cNvCxnSpPr>
+            <a:cxnSpLocks/>
+          </p:cNvCxnSpPr>
+          <p:nvPr/>
+        </p:nvCxnSpPr>
+        <p:spPr>
+          <a:xfrm flipH="1">
+            <a:off x="1308684" y="722574"/>
+            <a:ext cx="2091997" cy="0"/>
+          </a:xfrm>
+          <a:prstGeom prst="straightConnector1">
+            <a:avLst/>
+          </a:prstGeom>
+          <a:ln>
+            <a:headEnd type="triangle"/>
+            <a:tailEnd type="triangle"/>
+          </a:ln>
+        </p:spPr>
+        <p:style>
+          <a:lnRef idx="1">
+            <a:schemeClr val="accent1"/>
+          </a:lnRef>
+          <a:fillRef idx="0">
+            <a:schemeClr val="accent1"/>
+          </a:fillRef>
+          <a:effectRef idx="0">
+            <a:schemeClr val="accent1"/>
+          </a:effectRef>
+          <a:fontRef idx="minor">
+            <a:schemeClr val="tx1"/>
+          </a:fontRef>
+        </p:style>
+      </p:cxnSp>
+      <p:sp>
+        <p:nvSpPr>
+          <p:cNvPr id="47" name="TextBox 46">
+            <a:extLst>
+              <a:ext uri="{FF2B5EF4-FFF2-40B4-BE49-F238E27FC236}">
+                <a16:creationId xmlns:a16="http://schemas.microsoft.com/office/drawing/2014/main" id="{65408CBB-7867-4770-B7FA-0761E71238D7}"/>
+              </a:ext>
+            </a:extLst>
+          </p:cNvPr>
+          <p:cNvSpPr txBox="1"/>
+          <p:nvPr/>
+        </p:nvSpPr>
+        <p:spPr>
+          <a:xfrm>
+            <a:off x="2199968" y="571886"/>
+            <a:ext cx="396262" cy="184666"/>
+          </a:xfrm>
+          <a:prstGeom prst="rect">
+            <a:avLst/>
+          </a:prstGeom>
+          <a:noFill/>
+        </p:spPr>
+        <p:txBody>
+          <a:bodyPr wrap="none" rtlCol="0">
+            <a:spAutoFit/>
+          </a:bodyPr>
+          <a:lstStyle/>
+          <a:p>
+            <a:r>
+              <a:rPr lang="en-US" sz="600" dirty="0">
+                <a:latin typeface="Arial" panose="020B0604020202020204" pitchFamily="34" charset="0"/>
+                <a:cs typeface="Arial" panose="020B0604020202020204" pitchFamily="34" charset="0"/>
+              </a:rPr>
+              <a:t>400px</a:t>
+            </a:r>
+          </a:p>
+        </p:txBody>
+      </p:sp>
+      <p:sp>
+        <p:nvSpPr>
+          <p:cNvPr id="48" name="TextBox 47">
+            <a:extLst>
+              <a:ext uri="{FF2B5EF4-FFF2-40B4-BE49-F238E27FC236}">
+                <a16:creationId xmlns:a16="http://schemas.microsoft.com/office/drawing/2014/main" id="{2B1E616E-E52A-4365-B0E6-D8D958A167A5}"/>
+              </a:ext>
+            </a:extLst>
+          </p:cNvPr>
+          <p:cNvSpPr txBox="1"/>
+          <p:nvPr/>
+        </p:nvSpPr>
+        <p:spPr>
+          <a:xfrm rot="16200000">
+            <a:off x="908992" y="1751063"/>
+            <a:ext cx="396262" cy="184666"/>
+          </a:xfrm>
+          <a:prstGeom prst="rect">
+            <a:avLst/>
+          </a:prstGeom>
+          <a:noFill/>
+        </p:spPr>
+        <p:txBody>
+          <a:bodyPr wrap="none" rtlCol="0">
+            <a:spAutoFit/>
+          </a:bodyPr>
+          <a:lstStyle/>
+          <a:p>
+            <a:r>
+              <a:rPr lang="en-US" sz="600" dirty="0">
+                <a:latin typeface="Arial" panose="020B0604020202020204" pitchFamily="34" charset="0"/>
+                <a:cs typeface="Arial" panose="020B0604020202020204" pitchFamily="34" charset="0"/>
+              </a:rPr>
+              <a:t>400px</a:t>
+            </a:r>
+          </a:p>
+        </p:txBody>
+      </p:sp>
+      <p:cxnSp>
+        <p:nvCxnSpPr>
+          <p:cNvPr id="53" name="Straight Arrow Connector 52">
+            <a:extLst>
+              <a:ext uri="{FF2B5EF4-FFF2-40B4-BE49-F238E27FC236}">
+                <a16:creationId xmlns:a16="http://schemas.microsoft.com/office/drawing/2014/main" id="{91314C30-05D2-4614-B599-2E9575004D28}"/>
+              </a:ext>
+            </a:extLst>
+          </p:cNvPr>
+          <p:cNvCxnSpPr/>
+          <p:nvPr/>
+        </p:nvCxnSpPr>
+        <p:spPr>
+          <a:xfrm>
+            <a:off x="1612085" y="1944120"/>
+            <a:ext cx="0" cy="2091998"/>
+          </a:xfrm>
+          <a:prstGeom prst="straightConnector1">
+            <a:avLst/>
+          </a:prstGeom>
+          <a:ln>
+            <a:headEnd type="triangle"/>
+            <a:tailEnd type="triangle"/>
+          </a:ln>
+        </p:spPr>
+        <p:style>
+          <a:lnRef idx="1">
+            <a:schemeClr val="accent1"/>
+          </a:lnRef>
+          <a:fillRef idx="0">
+            <a:schemeClr val="accent1"/>
+          </a:fillRef>
+          <a:effectRef idx="0">
+            <a:schemeClr val="accent1"/>
+          </a:effectRef>
+          <a:fontRef idx="minor">
+            <a:schemeClr val="tx1"/>
+          </a:fontRef>
+        </p:style>
+      </p:cxnSp>
+      <p:cxnSp>
+        <p:nvCxnSpPr>
+          <p:cNvPr id="54" name="Straight Arrow Connector 53">
+            <a:extLst>
+              <a:ext uri="{FF2B5EF4-FFF2-40B4-BE49-F238E27FC236}">
+                <a16:creationId xmlns:a16="http://schemas.microsoft.com/office/drawing/2014/main" id="{C2E2E34E-1C50-4BBE-83AE-B185D28B5A42}"/>
+              </a:ext>
+            </a:extLst>
+          </p:cNvPr>
+          <p:cNvCxnSpPr>
+            <a:cxnSpLocks/>
+          </p:cNvCxnSpPr>
+          <p:nvPr/>
+        </p:nvCxnSpPr>
+        <p:spPr>
+          <a:xfrm flipH="1">
+            <a:off x="1721143" y="1864876"/>
+            <a:ext cx="2091997" cy="0"/>
+          </a:xfrm>
+          <a:prstGeom prst="straightConnector1">
+            <a:avLst/>
+          </a:prstGeom>
+          <a:ln>
+            <a:headEnd type="triangle"/>
+            <a:tailEnd type="triangle"/>
+          </a:ln>
+        </p:spPr>
+        <p:style>
+          <a:lnRef idx="1">
+            <a:schemeClr val="accent1"/>
+          </a:lnRef>
+          <a:fillRef idx="0">
+            <a:schemeClr val="accent1"/>
+          </a:fillRef>
+          <a:effectRef idx="0">
+            <a:schemeClr val="accent1"/>
+          </a:effectRef>
+          <a:fontRef idx="minor">
+            <a:schemeClr val="tx1"/>
+          </a:fontRef>
+        </p:style>
+      </p:cxnSp>
+      <p:sp>
+        <p:nvSpPr>
+          <p:cNvPr id="55" name="TextBox 54">
+            <a:extLst>
+              <a:ext uri="{FF2B5EF4-FFF2-40B4-BE49-F238E27FC236}">
+                <a16:creationId xmlns:a16="http://schemas.microsoft.com/office/drawing/2014/main" id="{41874EFC-922C-4CA0-BCE6-91BFA6EE8CD7}"/>
+              </a:ext>
+            </a:extLst>
+          </p:cNvPr>
+          <p:cNvSpPr txBox="1"/>
+          <p:nvPr/>
+        </p:nvSpPr>
+        <p:spPr>
+          <a:xfrm>
+            <a:off x="2612427" y="1714188"/>
+            <a:ext cx="396262" cy="184666"/>
+          </a:xfrm>
+          <a:prstGeom prst="rect">
+            <a:avLst/>
+          </a:prstGeom>
+          <a:noFill/>
+        </p:spPr>
+        <p:txBody>
+          <a:bodyPr wrap="none" rtlCol="0">
+            <a:spAutoFit/>
+          </a:bodyPr>
+          <a:lstStyle/>
+          <a:p>
+            <a:r>
+              <a:rPr lang="en-US" sz="600" dirty="0">
+                <a:latin typeface="Arial" panose="020B0604020202020204" pitchFamily="34" charset="0"/>
+                <a:cs typeface="Arial" panose="020B0604020202020204" pitchFamily="34" charset="0"/>
+              </a:rPr>
+              <a:t>400px</a:t>
+            </a:r>
+          </a:p>
+        </p:txBody>
+      </p:sp>
+      <p:sp>
+        <p:nvSpPr>
+          <p:cNvPr id="56" name="TextBox 55">
+            <a:extLst>
+              <a:ext uri="{FF2B5EF4-FFF2-40B4-BE49-F238E27FC236}">
+                <a16:creationId xmlns:a16="http://schemas.microsoft.com/office/drawing/2014/main" id="{F571036B-9E1B-4163-8B0D-EE4DD39A2C6A}"/>
+              </a:ext>
+            </a:extLst>
+          </p:cNvPr>
+          <p:cNvSpPr txBox="1"/>
+          <p:nvPr/>
+        </p:nvSpPr>
+        <p:spPr>
+          <a:xfrm rot="16200000">
+            <a:off x="1321451" y="2893365"/>
+            <a:ext cx="396262" cy="184666"/>
+          </a:xfrm>
+          <a:prstGeom prst="rect">
+            <a:avLst/>
+          </a:prstGeom>
+          <a:noFill/>
+        </p:spPr>
+        <p:txBody>
+          <a:bodyPr wrap="none" rtlCol="0">
+            <a:spAutoFit/>
+          </a:bodyPr>
+          <a:lstStyle/>
+          <a:p>
+            <a:r>
+              <a:rPr lang="en-US" sz="600" dirty="0">
+                <a:latin typeface="Arial" panose="020B0604020202020204" pitchFamily="34" charset="0"/>
+                <a:cs typeface="Arial" panose="020B0604020202020204" pitchFamily="34" charset="0"/>
+              </a:rPr>
+              <a:t>400px</a:t>
+            </a:r>
+          </a:p>
+        </p:txBody>
+      </p:sp>
+      <p:cxnSp>
+        <p:nvCxnSpPr>
+          <p:cNvPr id="57" name="Straight Arrow Connector 56">
+            <a:extLst>
+              <a:ext uri="{FF2B5EF4-FFF2-40B4-BE49-F238E27FC236}">
+                <a16:creationId xmlns:a16="http://schemas.microsoft.com/office/drawing/2014/main" id="{5A317DE1-19DC-443B-B6F6-9CD666106ABA}"/>
+              </a:ext>
+            </a:extLst>
+          </p:cNvPr>
+          <p:cNvCxnSpPr>
+            <a:cxnSpLocks/>
+          </p:cNvCxnSpPr>
+          <p:nvPr/>
+        </p:nvCxnSpPr>
+        <p:spPr>
+          <a:xfrm>
+            <a:off x="7032017" y="796543"/>
+            <a:ext cx="0" cy="3185112"/>
+          </a:xfrm>
+          <a:prstGeom prst="straightConnector1">
+            <a:avLst/>
+          </a:prstGeom>
+          <a:ln>
+            <a:headEnd type="triangle"/>
+            <a:tailEnd type="triangle"/>
+          </a:ln>
+        </p:spPr>
+        <p:style>
+          <a:lnRef idx="1">
+            <a:schemeClr val="accent1"/>
+          </a:lnRef>
+          <a:fillRef idx="0">
+            <a:schemeClr val="accent1"/>
+          </a:fillRef>
+          <a:effectRef idx="0">
+            <a:schemeClr val="accent1"/>
+          </a:effectRef>
+          <a:fontRef idx="minor">
+            <a:schemeClr val="tx1"/>
+          </a:fontRef>
+        </p:style>
+      </p:cxnSp>
+      <p:cxnSp>
+        <p:nvCxnSpPr>
+          <p:cNvPr id="58" name="Straight Arrow Connector 57">
+            <a:extLst>
+              <a:ext uri="{FF2B5EF4-FFF2-40B4-BE49-F238E27FC236}">
+                <a16:creationId xmlns:a16="http://schemas.microsoft.com/office/drawing/2014/main" id="{92A6EB65-B7B6-44CC-AEE9-29DC6D1486F8}"/>
+              </a:ext>
+            </a:extLst>
+          </p:cNvPr>
+          <p:cNvCxnSpPr>
+            <a:cxnSpLocks/>
+          </p:cNvCxnSpPr>
+          <p:nvPr/>
+        </p:nvCxnSpPr>
+        <p:spPr>
+          <a:xfrm flipH="1">
+            <a:off x="7124298" y="717299"/>
+            <a:ext cx="3196614" cy="0"/>
+          </a:xfrm>
+          <a:prstGeom prst="straightConnector1">
+            <a:avLst/>
+          </a:prstGeom>
+          <a:ln>
+            <a:headEnd type="triangle"/>
+            <a:tailEnd type="triangle"/>
+          </a:ln>
+        </p:spPr>
+        <p:style>
+          <a:lnRef idx="1">
+            <a:schemeClr val="accent1"/>
+          </a:lnRef>
+          <a:fillRef idx="0">
+            <a:schemeClr val="accent1"/>
+          </a:fillRef>
+          <a:effectRef idx="0">
+            <a:schemeClr val="accent1"/>
+          </a:effectRef>
+          <a:fontRef idx="minor">
+            <a:schemeClr val="tx1"/>
+          </a:fontRef>
+        </p:style>
+      </p:cxnSp>
+      <p:sp>
+        <p:nvSpPr>
+          <p:cNvPr id="59" name="TextBox 58">
+            <a:extLst>
+              <a:ext uri="{FF2B5EF4-FFF2-40B4-BE49-F238E27FC236}">
+                <a16:creationId xmlns:a16="http://schemas.microsoft.com/office/drawing/2014/main" id="{B9696C9E-B1FC-405B-9478-5E785E24D21D}"/>
+              </a:ext>
+            </a:extLst>
+          </p:cNvPr>
+          <p:cNvSpPr txBox="1"/>
+          <p:nvPr/>
+        </p:nvSpPr>
+        <p:spPr>
+          <a:xfrm>
+            <a:off x="8611200" y="566611"/>
+            <a:ext cx="396262" cy="184666"/>
+          </a:xfrm>
+          <a:prstGeom prst="rect">
+            <a:avLst/>
+          </a:prstGeom>
+          <a:noFill/>
+        </p:spPr>
+        <p:txBody>
+          <a:bodyPr wrap="none" rtlCol="0">
+            <a:spAutoFit/>
+          </a:bodyPr>
+          <a:lstStyle/>
+          <a:p>
+            <a:r>
+              <a:rPr lang="en-US" sz="600" dirty="0">
+                <a:latin typeface="Arial" panose="020B0604020202020204" pitchFamily="34" charset="0"/>
+                <a:cs typeface="Arial" panose="020B0604020202020204" pitchFamily="34" charset="0"/>
+              </a:rPr>
+              <a:t>608px</a:t>
+            </a:r>
+          </a:p>
+        </p:txBody>
+      </p:sp>
+      <p:sp>
+        <p:nvSpPr>
+          <p:cNvPr id="60" name="TextBox 59">
+            <a:extLst>
+              <a:ext uri="{FF2B5EF4-FFF2-40B4-BE49-F238E27FC236}">
+                <a16:creationId xmlns:a16="http://schemas.microsoft.com/office/drawing/2014/main" id="{45E596FF-16F2-45FF-B78E-D1F422B3226B}"/>
+              </a:ext>
+            </a:extLst>
+          </p:cNvPr>
+          <p:cNvSpPr txBox="1"/>
+          <p:nvPr/>
+        </p:nvSpPr>
+        <p:spPr>
+          <a:xfrm rot="16200000">
+            <a:off x="6741383" y="2173627"/>
+            <a:ext cx="396262" cy="184666"/>
+          </a:xfrm>
+          <a:prstGeom prst="rect">
+            <a:avLst/>
+          </a:prstGeom>
+          <a:noFill/>
+        </p:spPr>
+        <p:txBody>
+          <a:bodyPr wrap="none" rtlCol="0">
+            <a:spAutoFit/>
+          </a:bodyPr>
+          <a:lstStyle/>
+          <a:p>
+            <a:r>
+              <a:rPr lang="en-US" sz="600" dirty="0">
+                <a:latin typeface="Arial" panose="020B0604020202020204" pitchFamily="34" charset="0"/>
+                <a:cs typeface="Arial" panose="020B0604020202020204" pitchFamily="34" charset="0"/>
+              </a:rPr>
+              <a:t>608px</a:t>
+            </a:r>
+          </a:p>
+        </p:txBody>
+      </p:sp>
+      <p:cxnSp>
+        <p:nvCxnSpPr>
+          <p:cNvPr id="63" name="Straight Arrow Connector 62">
+            <a:extLst>
+              <a:ext uri="{FF2B5EF4-FFF2-40B4-BE49-F238E27FC236}">
+                <a16:creationId xmlns:a16="http://schemas.microsoft.com/office/drawing/2014/main" id="{E12A74CC-0CB2-4262-84CE-B811CFE8772F}"/>
+              </a:ext>
+            </a:extLst>
+          </p:cNvPr>
+          <p:cNvCxnSpPr>
+            <a:cxnSpLocks/>
+          </p:cNvCxnSpPr>
+          <p:nvPr/>
+        </p:nvCxnSpPr>
+        <p:spPr>
+          <a:xfrm>
+            <a:off x="8388341" y="4166071"/>
+            <a:ext cx="0" cy="843446"/>
+          </a:xfrm>
+          <a:prstGeom prst="straightConnector1">
+            <a:avLst/>
+          </a:prstGeom>
+          <a:ln>
+            <a:headEnd type="triangle"/>
+            <a:tailEnd type="triangle"/>
+          </a:ln>
+        </p:spPr>
+        <p:style>
+          <a:lnRef idx="1">
+            <a:schemeClr val="accent1"/>
+          </a:lnRef>
+          <a:fillRef idx="0">
+            <a:schemeClr val="accent1"/>
+          </a:fillRef>
+          <a:effectRef idx="0">
+            <a:schemeClr val="accent1"/>
+          </a:effectRef>
+          <a:fontRef idx="minor">
+            <a:schemeClr val="tx1"/>
+          </a:fontRef>
+        </p:style>
+      </p:cxnSp>
+      <p:cxnSp>
+        <p:nvCxnSpPr>
+          <p:cNvPr id="64" name="Straight Arrow Connector 63">
+            <a:extLst>
+              <a:ext uri="{FF2B5EF4-FFF2-40B4-BE49-F238E27FC236}">
+                <a16:creationId xmlns:a16="http://schemas.microsoft.com/office/drawing/2014/main" id="{9E593852-757E-4AEA-A840-ED3EA0275575}"/>
+              </a:ext>
+            </a:extLst>
+          </p:cNvPr>
+          <p:cNvCxnSpPr>
+            <a:cxnSpLocks/>
+          </p:cNvCxnSpPr>
+          <p:nvPr/>
+        </p:nvCxnSpPr>
+        <p:spPr>
+          <a:xfrm flipH="1">
+            <a:off x="8447066" y="4120383"/>
+            <a:ext cx="807507" cy="0"/>
+          </a:xfrm>
+          <a:prstGeom prst="straightConnector1">
+            <a:avLst/>
+          </a:prstGeom>
+          <a:ln>
+            <a:headEnd type="triangle"/>
+            <a:tailEnd type="triangle"/>
+          </a:ln>
+        </p:spPr>
+        <p:style>
+          <a:lnRef idx="1">
+            <a:schemeClr val="accent1"/>
+          </a:lnRef>
+          <a:fillRef idx="0">
+            <a:schemeClr val="accent1"/>
+          </a:fillRef>
+          <a:effectRef idx="0">
+            <a:schemeClr val="accent1"/>
+          </a:effectRef>
+          <a:fontRef idx="minor">
+            <a:schemeClr val="tx1"/>
+          </a:fontRef>
+        </p:style>
+      </p:cxnSp>
+      <p:sp>
+        <p:nvSpPr>
+          <p:cNvPr id="65" name="TextBox 64">
+            <a:extLst>
+              <a:ext uri="{FF2B5EF4-FFF2-40B4-BE49-F238E27FC236}">
+                <a16:creationId xmlns:a16="http://schemas.microsoft.com/office/drawing/2014/main" id="{1061BAA8-F6BC-4EB3-BF89-F33E8F9D1B99}"/>
+              </a:ext>
+            </a:extLst>
+          </p:cNvPr>
+          <p:cNvSpPr txBox="1"/>
+          <p:nvPr/>
+        </p:nvSpPr>
+        <p:spPr>
+          <a:xfrm>
+            <a:off x="8684007" y="3961306"/>
+            <a:ext cx="352982" cy="184666"/>
+          </a:xfrm>
+          <a:prstGeom prst="rect">
+            <a:avLst/>
+          </a:prstGeom>
+          <a:noFill/>
+        </p:spPr>
+        <p:txBody>
+          <a:bodyPr wrap="none" rtlCol="0">
+            <a:spAutoFit/>
+          </a:bodyPr>
+          <a:lstStyle/>
+          <a:p>
+            <a:r>
+              <a:rPr lang="en-US" sz="600" dirty="0">
+                <a:latin typeface="Arial" panose="020B0604020202020204" pitchFamily="34" charset="0"/>
+                <a:cs typeface="Arial" panose="020B0604020202020204" pitchFamily="34" charset="0"/>
+              </a:rPr>
+              <a:t>38px</a:t>
+            </a:r>
+          </a:p>
+        </p:txBody>
+      </p:sp>
+      <p:sp>
+        <p:nvSpPr>
+          <p:cNvPr id="66" name="TextBox 65">
+            <a:extLst>
+              <a:ext uri="{FF2B5EF4-FFF2-40B4-BE49-F238E27FC236}">
+                <a16:creationId xmlns:a16="http://schemas.microsoft.com/office/drawing/2014/main" id="{EA3BC3E5-E527-43DF-97FA-3390D2C790C8}"/>
+              </a:ext>
+            </a:extLst>
+          </p:cNvPr>
+          <p:cNvSpPr txBox="1"/>
+          <p:nvPr/>
+        </p:nvSpPr>
+        <p:spPr>
+          <a:xfrm rot="16200000">
+            <a:off x="8110958" y="4368695"/>
+            <a:ext cx="352982" cy="184666"/>
+          </a:xfrm>
+          <a:prstGeom prst="rect">
+            <a:avLst/>
+          </a:prstGeom>
+          <a:noFill/>
+        </p:spPr>
+        <p:txBody>
+          <a:bodyPr wrap="none" rtlCol="0">
+            <a:spAutoFit/>
+          </a:bodyPr>
+          <a:lstStyle/>
+          <a:p>
+            <a:r>
+              <a:rPr lang="en-US" sz="600" dirty="0">
+                <a:latin typeface="Arial" panose="020B0604020202020204" pitchFamily="34" charset="0"/>
+                <a:cs typeface="Arial" panose="020B0604020202020204" pitchFamily="34" charset="0"/>
+              </a:rPr>
+              <a:t>38px</a:t>
+            </a:r>
+          </a:p>
+        </p:txBody>
+      </p:sp>
+    </p:spTree>
+    <p:extLst>
+      <p:ext uri="{BB962C8B-B14F-4D97-AF65-F5344CB8AC3E}">
+        <p14:creationId xmlns:p14="http://schemas.microsoft.com/office/powerpoint/2010/main" val="3338832246"/>
+      </p:ext>
+    </p:extLst>
+  </p:cSld>
+  <p:clrMapOvr>
+    <a:masterClrMapping/>
+  </p:clrMapOvr>
+</p:sld>
+</file>
+
 <file path=ppt/theme/theme1.xml><?xml version="1.0" encoding="utf-8"?>
 <a:theme xmlns:a="http://schemas.openxmlformats.org/drawingml/2006/main" name="Office Theme">
   <a:themeElements>

</xml_diff>